<commit_message>
add slaid in pptx and add file pptx
</commit_message>
<xml_diff>
--- a/files/Шаблон/Самотлорское_итоговый.pptx
+++ b/files/Шаблон/Самотлорское_итоговый.pptx
@@ -5,10 +5,10 @@
     <p:sldMasterId id="2147483648" r:id="rId1"/>
   </p:sldMasterIdLst>
   <p:notesMasterIdLst>
-    <p:notesMasterId r:id="rId9"/>
+    <p:notesMasterId r:id="rId10"/>
   </p:notesMasterIdLst>
   <p:handoutMasterIdLst>
-    <p:handoutMasterId r:id="rId10"/>
+    <p:handoutMasterId r:id="rId11"/>
   </p:handoutMasterIdLst>
   <p:sldIdLst>
     <p:sldId id="283" r:id="rId2"/>
@@ -16,8 +16,9 @@
     <p:sldId id="302" r:id="rId4"/>
     <p:sldId id="301" r:id="rId5"/>
     <p:sldId id="298" r:id="rId6"/>
-    <p:sldId id="299" r:id="rId7"/>
-    <p:sldId id="297" r:id="rId8"/>
+    <p:sldId id="303" r:id="rId7"/>
+    <p:sldId id="299" r:id="rId8"/>
+    <p:sldId id="297" r:id="rId9"/>
   </p:sldIdLst>
   <p:sldSz cx="9144000" cy="6858000" type="screen4x3"/>
   <p:notesSz cx="6797675" cy="9926638"/>
@@ -271,7 +272,7 @@
               <a:pPr>
                 <a:defRPr/>
               </a:pPr>
-              <a:t>12.07.2024</a:t>
+              <a:t>15.07.2024</a:t>
             </a:fld>
             <a:endParaRPr lang="ru-RU" altLang="ru-RU"/>
           </a:p>
@@ -1367,7 +1368,7 @@
     </p:spTree>
     <p:extLst>
       <p:ext uri="{BB962C8B-B14F-4D97-AF65-F5344CB8AC3E}">
-        <p14:creationId xmlns:p14="http://schemas.microsoft.com/office/powerpoint/2010/main" val="2382963821"/>
+        <p14:creationId xmlns:p14="http://schemas.microsoft.com/office/powerpoint/2010/main" val="1801835351"/>
       </p:ext>
     </p:extLst>
   </p:cSld>
@@ -1449,6 +1450,96 @@
                 <a:defRPr/>
               </a:pPr>
               <a:t>7</a:t>
+            </a:fld>
+            <a:endParaRPr lang="ru-RU" altLang="ru-RU"/>
+          </a:p>
+        </p:txBody>
+      </p:sp>
+    </p:spTree>
+    <p:extLst>
+      <p:ext uri="{BB962C8B-B14F-4D97-AF65-F5344CB8AC3E}">
+        <p14:creationId xmlns:p14="http://schemas.microsoft.com/office/powerpoint/2010/main" val="2382963821"/>
+      </p:ext>
+    </p:extLst>
+  </p:cSld>
+  <p:clrMapOvr>
+    <a:masterClrMapping/>
+  </p:clrMapOvr>
+</p:notes>
+</file>
+
+<file path=ppt/notesSlides/notesSlide8.xml><?xml version="1.0" encoding="utf-8"?>
+<p:notes xmlns:a="http://schemas.openxmlformats.org/drawingml/2006/main" xmlns:r="http://schemas.openxmlformats.org/officeDocument/2006/relationships" xmlns:p="http://schemas.openxmlformats.org/presentationml/2006/main">
+  <p:cSld>
+    <p:spTree>
+      <p:nvGrpSpPr>
+        <p:cNvPr id="1" name=""/>
+        <p:cNvGrpSpPr/>
+        <p:nvPr/>
+      </p:nvGrpSpPr>
+      <p:grpSpPr>
+        <a:xfrm>
+          <a:off x="0" y="0"/>
+          <a:ext cx="0" cy="0"/>
+          <a:chOff x="0" y="0"/>
+          <a:chExt cx="0" cy="0"/>
+        </a:xfrm>
+      </p:grpSpPr>
+      <p:sp>
+        <p:nvSpPr>
+          <p:cNvPr id="2" name="Образ слайда 1"/>
+          <p:cNvSpPr>
+            <a:spLocks noGrp="1" noRot="1" noChangeAspect="1"/>
+          </p:cNvSpPr>
+          <p:nvPr>
+            <p:ph type="sldImg"/>
+          </p:nvPr>
+        </p:nvSpPr>
+        <p:spPr/>
+      </p:sp>
+      <p:sp>
+        <p:nvSpPr>
+          <p:cNvPr id="3" name="Заметки 2"/>
+          <p:cNvSpPr>
+            <a:spLocks noGrp="1"/>
+          </p:cNvSpPr>
+          <p:nvPr>
+            <p:ph type="body" idx="1"/>
+          </p:nvPr>
+        </p:nvSpPr>
+        <p:spPr/>
+        <p:txBody>
+          <a:bodyPr/>
+          <a:lstStyle/>
+          <a:p>
+            <a:endParaRPr lang="ru-RU"/>
+          </a:p>
+        </p:txBody>
+      </p:sp>
+      <p:sp>
+        <p:nvSpPr>
+          <p:cNvPr id="4" name="Номер слайда 3"/>
+          <p:cNvSpPr>
+            <a:spLocks noGrp="1"/>
+          </p:cNvSpPr>
+          <p:nvPr>
+            <p:ph type="sldNum" sz="quarter" idx="10"/>
+          </p:nvPr>
+        </p:nvSpPr>
+        <p:spPr/>
+        <p:txBody>
+          <a:bodyPr/>
+          <a:lstStyle/>
+          <a:p>
+            <a:pPr>
+              <a:defRPr/>
+            </a:pPr>
+            <a:fld id="{3ADE64BB-21CD-4D13-8006-441A0FCF7E4C}" type="slidenum">
+              <a:rPr lang="ru-RU" altLang="ru-RU" smtClean="0"/>
+              <a:pPr>
+                <a:defRPr/>
+              </a:pPr>
+              <a:t>8</a:t>
             </a:fld>
             <a:endParaRPr lang="ru-RU" altLang="ru-RU"/>
           </a:p>
@@ -12604,6 +12695,707 @@
       </p:grpSpPr>
       <p:sp>
         <p:nvSpPr>
+          <p:cNvPr id="4" name="AutoShape 2" descr="астанавитесь, Мем Остановитесь - Янукович"/>
+          <p:cNvSpPr>
+            <a:spLocks noChangeAspect="1" noChangeArrowheads="1"/>
+          </p:cNvSpPr>
+          <p:nvPr/>
+        </p:nvSpPr>
+        <p:spPr bwMode="auto">
+          <a:xfrm>
+            <a:off x="155575" y="-144463"/>
+            <a:ext cx="304800" cy="304801"/>
+          </a:xfrm>
+          <a:prstGeom prst="rect">
+            <a:avLst/>
+          </a:prstGeom>
+          <a:noFill/>
+          <a:extLst>
+            <a:ext uri="{909E8E84-426E-40DD-AFC4-6F175D3DCCD1}">
+              <a14:hiddenFill xmlns:a14="http://schemas.microsoft.com/office/drawing/2010/main">
+                <a:solidFill>
+                  <a:srgbClr val="FFFFFF"/>
+                </a:solidFill>
+              </a14:hiddenFill>
+            </a:ext>
+          </a:extLst>
+        </p:spPr>
+        <p:txBody>
+          <a:bodyPr vert="horz" wrap="square" lIns="91440" tIns="45720" rIns="91440" bIns="45720" numCol="1" anchor="t" anchorCtr="0" compatLnSpc="1">
+            <a:prstTxWarp prst="textNoShape">
+              <a:avLst/>
+            </a:prstTxWarp>
+          </a:bodyPr>
+          <a:lstStyle/>
+          <a:p>
+            <a:endParaRPr lang="ru-RU">
+              <a:solidFill>
+                <a:srgbClr val="FF0000"/>
+              </a:solidFill>
+              <a:latin typeface="Segoe UI" panose="020B0502040204020203" pitchFamily="34" charset="0"/>
+              <a:cs typeface="Segoe UI" panose="020B0502040204020203" pitchFamily="34" charset="0"/>
+            </a:endParaRPr>
+          </a:p>
+        </p:txBody>
+      </p:sp>
+      <p:sp>
+        <p:nvSpPr>
+          <p:cNvPr id="8" name="Rectangle 2"/>
+          <p:cNvSpPr txBox="1">
+            <a:spLocks noChangeArrowheads="1"/>
+          </p:cNvSpPr>
+          <p:nvPr/>
+        </p:nvSpPr>
+        <p:spPr bwMode="auto">
+          <a:xfrm>
+            <a:off x="1616075" y="179388"/>
+            <a:ext cx="7481888" cy="300037"/>
+          </a:xfrm>
+          <a:prstGeom prst="rect">
+            <a:avLst/>
+          </a:prstGeom>
+          <a:noFill/>
+          <a:ln>
+            <a:noFill/>
+          </a:ln>
+          <a:extLst>
+            <a:ext uri="{909E8E84-426E-40DD-AFC4-6F175D3DCCD1}">
+              <a14:hiddenFill xmlns:a14="http://schemas.microsoft.com/office/drawing/2010/main">
+                <a:solidFill>
+                  <a:srgbClr val="FFFFFF"/>
+                </a:solidFill>
+              </a14:hiddenFill>
+            </a:ext>
+            <a:ext uri="{91240B29-F687-4F45-9708-019B960494DF}">
+              <a14:hiddenLine xmlns:a14="http://schemas.microsoft.com/office/drawing/2010/main" w="9525">
+                <a:solidFill>
+                  <a:srgbClr val="000000"/>
+                </a:solidFill>
+                <a:miter lim="800000"/>
+                <a:headEnd/>
+                <a:tailEnd/>
+              </a14:hiddenLine>
+            </a:ext>
+          </a:extLst>
+        </p:spPr>
+        <p:txBody>
+          <a:bodyPr vert="horz" wrap="square" lIns="91440" tIns="45720" rIns="91440" bIns="45720" numCol="1" anchor="ctr" anchorCtr="0" compatLnSpc="1">
+            <a:prstTxWarp prst="textNoShape">
+              <a:avLst/>
+            </a:prstTxWarp>
+          </a:bodyPr>
+          <a:lstStyle>
+            <a:lvl1pPr algn="r" rtl="0" eaLnBrk="0" fontAlgn="base" hangingPunct="0">
+              <a:spcBef>
+                <a:spcPct val="0"/>
+              </a:spcBef>
+              <a:spcAft>
+                <a:spcPct val="0"/>
+              </a:spcAft>
+              <a:defRPr b="1">
+                <a:solidFill>
+                  <a:schemeClr val="tx1"/>
+                </a:solidFill>
+                <a:latin typeface="+mj-lt"/>
+                <a:ea typeface="+mj-ea"/>
+                <a:cs typeface="+mj-cs"/>
+              </a:defRPr>
+            </a:lvl1pPr>
+            <a:lvl2pPr algn="r" rtl="0" eaLnBrk="0" fontAlgn="base" hangingPunct="0">
+              <a:spcBef>
+                <a:spcPct val="0"/>
+              </a:spcBef>
+              <a:spcAft>
+                <a:spcPct val="0"/>
+              </a:spcAft>
+              <a:defRPr b="1">
+                <a:solidFill>
+                  <a:schemeClr val="tx1"/>
+                </a:solidFill>
+                <a:latin typeface="Century Gothic" pitchFamily="34" charset="0"/>
+              </a:defRPr>
+            </a:lvl2pPr>
+            <a:lvl3pPr algn="r" rtl="0" eaLnBrk="0" fontAlgn="base" hangingPunct="0">
+              <a:spcBef>
+                <a:spcPct val="0"/>
+              </a:spcBef>
+              <a:spcAft>
+                <a:spcPct val="0"/>
+              </a:spcAft>
+              <a:defRPr b="1">
+                <a:solidFill>
+                  <a:schemeClr val="tx1"/>
+                </a:solidFill>
+                <a:latin typeface="Century Gothic" pitchFamily="34" charset="0"/>
+              </a:defRPr>
+            </a:lvl3pPr>
+            <a:lvl4pPr algn="r" rtl="0" eaLnBrk="0" fontAlgn="base" hangingPunct="0">
+              <a:spcBef>
+                <a:spcPct val="0"/>
+              </a:spcBef>
+              <a:spcAft>
+                <a:spcPct val="0"/>
+              </a:spcAft>
+              <a:defRPr b="1">
+                <a:solidFill>
+                  <a:schemeClr val="tx1"/>
+                </a:solidFill>
+                <a:latin typeface="Century Gothic" pitchFamily="34" charset="0"/>
+              </a:defRPr>
+            </a:lvl4pPr>
+            <a:lvl5pPr algn="r" rtl="0" eaLnBrk="0" fontAlgn="base" hangingPunct="0">
+              <a:spcBef>
+                <a:spcPct val="0"/>
+              </a:spcBef>
+              <a:spcAft>
+                <a:spcPct val="0"/>
+              </a:spcAft>
+              <a:defRPr b="1">
+                <a:solidFill>
+                  <a:schemeClr val="tx1"/>
+                </a:solidFill>
+                <a:latin typeface="Century Gothic" pitchFamily="34" charset="0"/>
+              </a:defRPr>
+            </a:lvl5pPr>
+            <a:lvl6pPr marL="457200" algn="r" rtl="0" fontAlgn="base">
+              <a:spcBef>
+                <a:spcPct val="0"/>
+              </a:spcBef>
+              <a:spcAft>
+                <a:spcPct val="0"/>
+              </a:spcAft>
+              <a:defRPr b="1">
+                <a:solidFill>
+                  <a:schemeClr val="tx1"/>
+                </a:solidFill>
+                <a:latin typeface="Century Gothic" pitchFamily="34" charset="0"/>
+              </a:defRPr>
+            </a:lvl6pPr>
+            <a:lvl7pPr marL="914400" algn="r" rtl="0" fontAlgn="base">
+              <a:spcBef>
+                <a:spcPct val="0"/>
+              </a:spcBef>
+              <a:spcAft>
+                <a:spcPct val="0"/>
+              </a:spcAft>
+              <a:defRPr b="1">
+                <a:solidFill>
+                  <a:schemeClr val="tx1"/>
+                </a:solidFill>
+                <a:latin typeface="Century Gothic" pitchFamily="34" charset="0"/>
+              </a:defRPr>
+            </a:lvl7pPr>
+            <a:lvl8pPr marL="1371600" algn="r" rtl="0" fontAlgn="base">
+              <a:spcBef>
+                <a:spcPct val="0"/>
+              </a:spcBef>
+              <a:spcAft>
+                <a:spcPct val="0"/>
+              </a:spcAft>
+              <a:defRPr b="1">
+                <a:solidFill>
+                  <a:schemeClr val="tx1"/>
+                </a:solidFill>
+                <a:latin typeface="Century Gothic" pitchFamily="34" charset="0"/>
+              </a:defRPr>
+            </a:lvl8pPr>
+            <a:lvl9pPr marL="1828800" algn="r" rtl="0" fontAlgn="base">
+              <a:spcBef>
+                <a:spcPct val="0"/>
+              </a:spcBef>
+              <a:spcAft>
+                <a:spcPct val="0"/>
+              </a:spcAft>
+              <a:defRPr b="1">
+                <a:solidFill>
+                  <a:schemeClr val="tx1"/>
+                </a:solidFill>
+                <a:latin typeface="Century Gothic" pitchFamily="34" charset="0"/>
+              </a:defRPr>
+            </a:lvl9pPr>
+          </a:lstStyle>
+          <a:p>
+            <a:pPr algn="l" eaLnBrk="1" hangingPunct="1"/>
+            <a:r>
+              <a:rPr lang="ru-RU" altLang="ru-RU" dirty="0">
+                <a:latin typeface="Segoe UI" panose="020B0502040204020203" pitchFamily="34" charset="0"/>
+                <a:cs typeface="Segoe UI" panose="020B0502040204020203" pitchFamily="34" charset="0"/>
+              </a:rPr>
+              <a:t>Анализ </a:t>
+            </a:r>
+            <a:r>
+              <a:rPr lang="ru-RU" altLang="ru-RU" dirty="0" smtClean="0">
+                <a:latin typeface="Segoe UI" panose="020B0502040204020203" pitchFamily="34" charset="0"/>
+                <a:cs typeface="Segoe UI" panose="020B0502040204020203" pitchFamily="34" charset="0"/>
+              </a:rPr>
+              <a:t>данных, полученных по протоколу </a:t>
+            </a:r>
+            <a:r>
+              <a:rPr lang="en-US" altLang="ru-RU" dirty="0" smtClean="0">
+                <a:latin typeface="Segoe UI" panose="020B0502040204020203" pitchFamily="34" charset="0"/>
+                <a:cs typeface="Segoe UI" panose="020B0502040204020203" pitchFamily="34" charset="0"/>
+              </a:rPr>
+              <a:t>WITS0</a:t>
+            </a:r>
+            <a:endParaRPr lang="ru-RU" altLang="ru-RU" dirty="0">
+              <a:latin typeface="Segoe UI" panose="020B0502040204020203" pitchFamily="34" charset="0"/>
+              <a:cs typeface="Segoe UI" panose="020B0502040204020203" pitchFamily="34" charset="0"/>
+            </a:endParaRPr>
+          </a:p>
+        </p:txBody>
+      </p:sp>
+      <p:graphicFrame>
+        <p:nvGraphicFramePr>
+          <p:cNvPr id="3" name="Таблица 2"/>
+          <p:cNvGraphicFramePr>
+            <a:graphicFrameLocks noGrp="1"/>
+          </p:cNvGraphicFramePr>
+          <p:nvPr>
+            <p:extLst/>
+          </p:nvPr>
+        </p:nvGraphicFramePr>
+        <p:xfrm>
+          <a:off x="155575" y="658561"/>
+          <a:ext cx="8853254" cy="548638"/>
+        </p:xfrm>
+        <a:graphic>
+          <a:graphicData uri="http://schemas.openxmlformats.org/drawingml/2006/table">
+            <a:tbl>
+              <a:tblPr firstRow="1" bandRow="1">
+                <a:tableStyleId>{5940675A-B579-460E-94D1-54222C63F5DA}</a:tableStyleId>
+              </a:tblPr>
+              <a:tblGrid>
+                <a:gridCol w="2738700">
+                  <a:extLst>
+                    <a:ext uri="{9D8B030D-6E8A-4147-A177-3AD203B41FA5}">
+                      <a16:colId xmlns:a16="http://schemas.microsoft.com/office/drawing/2014/main" val="2391148262"/>
+                    </a:ext>
+                  </a:extLst>
+                </a:gridCol>
+                <a:gridCol w="1725433">
+                  <a:extLst>
+                    <a:ext uri="{9D8B030D-6E8A-4147-A177-3AD203B41FA5}">
+                      <a16:colId xmlns:a16="http://schemas.microsoft.com/office/drawing/2014/main" val="337475581"/>
+                    </a:ext>
+                  </a:extLst>
+                </a:gridCol>
+                <a:gridCol w="1967948">
+                  <a:extLst>
+                    <a:ext uri="{9D8B030D-6E8A-4147-A177-3AD203B41FA5}">
+                      <a16:colId xmlns:a16="http://schemas.microsoft.com/office/drawing/2014/main" val="1703225629"/>
+                    </a:ext>
+                  </a:extLst>
+                </a:gridCol>
+                <a:gridCol w="2421173">
+                  <a:extLst>
+                    <a:ext uri="{9D8B030D-6E8A-4147-A177-3AD203B41FA5}">
+                      <a16:colId xmlns:a16="http://schemas.microsoft.com/office/drawing/2014/main" val="3491107632"/>
+                    </a:ext>
+                  </a:extLst>
+                </a:gridCol>
+              </a:tblGrid>
+              <a:tr h="274319">
+                <a:tc>
+                  <a:txBody>
+                    <a:bodyPr/>
+                    <a:lstStyle/>
+                    <a:p>
+                      <a:r>
+                        <a:rPr lang="ru-RU" sz="1000" dirty="0" smtClean="0">
+                          <a:latin typeface="Segoe UI" panose="020B0502040204020203" pitchFamily="34" charset="0"/>
+                          <a:cs typeface="Segoe UI" panose="020B0502040204020203" pitchFamily="34" charset="0"/>
+                        </a:rPr>
+                        <a:t>Интервал предоставления</a:t>
+                      </a:r>
+                      <a:r>
+                        <a:rPr lang="ru-RU" sz="1000" baseline="0" dirty="0" smtClean="0">
+                          <a:latin typeface="Segoe UI" panose="020B0502040204020203" pitchFamily="34" charset="0"/>
+                          <a:cs typeface="Segoe UI" panose="020B0502040204020203" pitchFamily="34" charset="0"/>
+                        </a:rPr>
+                        <a:t> данных</a:t>
+                      </a:r>
+                      <a:r>
+                        <a:rPr lang="ru-RU" sz="1000" dirty="0" smtClean="0">
+                          <a:latin typeface="Segoe UI" panose="020B0502040204020203" pitchFamily="34" charset="0"/>
+                          <a:cs typeface="Segoe UI" panose="020B0502040204020203" pitchFamily="34" charset="0"/>
+                        </a:rPr>
+                        <a:t>, м</a:t>
+                      </a:r>
+                      <a:r>
+                        <a:rPr lang="en-US" sz="1000" dirty="0" smtClean="0">
+                          <a:latin typeface="Segoe UI" panose="020B0502040204020203" pitchFamily="34" charset="0"/>
+                          <a:cs typeface="Segoe UI" panose="020B0502040204020203" pitchFamily="34" charset="0"/>
+                        </a:rPr>
+                        <a:t> (MD)</a:t>
+                      </a:r>
+                      <a:endParaRPr lang="ru-RU" sz="1000" dirty="0">
+                        <a:latin typeface="Segoe UI" panose="020B0502040204020203" pitchFamily="34" charset="0"/>
+                        <a:cs typeface="Segoe UI" panose="020B0502040204020203" pitchFamily="34" charset="0"/>
+                      </a:endParaRPr>
+                    </a:p>
+                  </a:txBody>
+                  <a:tcPr anchor="ctr"/>
+                </a:tc>
+                <a:tc>
+                  <a:txBody>
+                    <a:bodyPr/>
+                    <a:lstStyle/>
+                    <a:p>
+                      <a:pPr marL="0" algn="l" defTabSz="914400" rtl="0" eaLnBrk="1" latinLnBrk="0" hangingPunct="1"/>
+                      <a:r>
+                        <a:rPr lang="ru-RU" sz="1000" kern="1200" dirty="0" smtClean="0">
+                          <a:solidFill>
+                            <a:schemeClr val="tx1"/>
+                          </a:solidFill>
+                          <a:latin typeface="Segoe UI" panose="020B0502040204020203" pitchFamily="34" charset="0"/>
+                          <a:ea typeface="+mn-ea"/>
+                          <a:cs typeface="Segoe UI" panose="020B0502040204020203" pitchFamily="34" charset="0"/>
+                        </a:rPr>
+                        <a:t>Корректность настроек</a:t>
+                      </a:r>
+                      <a:endParaRPr lang="ru-RU" sz="1000" kern="1200" dirty="0">
+                        <a:solidFill>
+                          <a:schemeClr val="tx1"/>
+                        </a:solidFill>
+                        <a:latin typeface="Segoe UI" panose="020B0502040204020203" pitchFamily="34" charset="0"/>
+                        <a:ea typeface="+mn-ea"/>
+                        <a:cs typeface="Segoe UI" panose="020B0502040204020203" pitchFamily="34" charset="0"/>
+                      </a:endParaRPr>
+                    </a:p>
+                  </a:txBody>
+                  <a:tcPr anchor="ctr"/>
+                </a:tc>
+                <a:tc>
+                  <a:txBody>
+                    <a:bodyPr/>
+                    <a:lstStyle/>
+                    <a:p>
+                      <a:pPr marL="0" algn="ctr" defTabSz="914400" rtl="0" eaLnBrk="1" latinLnBrk="0" hangingPunct="1"/>
+                      <a:r>
+                        <a:rPr lang="ru-RU" sz="1000" kern="1200" dirty="0" smtClean="0">
+                          <a:solidFill>
+                            <a:schemeClr val="tx1"/>
+                          </a:solidFill>
+                          <a:latin typeface="Segoe UI" panose="020B0502040204020203" pitchFamily="34" charset="0"/>
+                          <a:ea typeface="+mn-ea"/>
+                          <a:cs typeface="Segoe UI" panose="020B0502040204020203" pitchFamily="34" charset="0"/>
+                        </a:rPr>
+                        <a:t>Соответствие данных</a:t>
+                      </a:r>
+                      <a:endParaRPr lang="ru-RU" sz="1000" kern="1200" dirty="0">
+                        <a:solidFill>
+                          <a:schemeClr val="tx1"/>
+                        </a:solidFill>
+                        <a:latin typeface="Segoe UI" panose="020B0502040204020203" pitchFamily="34" charset="0"/>
+                        <a:ea typeface="+mn-ea"/>
+                        <a:cs typeface="Segoe UI" panose="020B0502040204020203" pitchFamily="34" charset="0"/>
+                      </a:endParaRPr>
+                    </a:p>
+                  </a:txBody>
+                  <a:tcPr anchor="ctr"/>
+                </a:tc>
+                <a:tc>
+                  <a:txBody>
+                    <a:bodyPr/>
+                    <a:lstStyle/>
+                    <a:p>
+                      <a:pPr marL="0" algn="l" defTabSz="914400" rtl="0" eaLnBrk="1" latinLnBrk="0" hangingPunct="1"/>
+                      <a:r>
+                        <a:rPr lang="ru-RU" sz="1000" kern="1200" dirty="0" smtClean="0">
+                          <a:solidFill>
+                            <a:schemeClr val="tx1"/>
+                          </a:solidFill>
+                          <a:latin typeface="Segoe UI" panose="020B0502040204020203" pitchFamily="34" charset="0"/>
+                          <a:ea typeface="+mn-ea"/>
+                          <a:cs typeface="Segoe UI" panose="020B0502040204020203" pitchFamily="34" charset="0"/>
+                        </a:rPr>
+                        <a:t>Интервал отсутствия данных, м</a:t>
+                      </a:r>
+                      <a:r>
+                        <a:rPr lang="en-US" sz="1000" kern="1200" dirty="0" smtClean="0">
+                          <a:solidFill>
+                            <a:schemeClr val="tx1"/>
+                          </a:solidFill>
+                          <a:latin typeface="Segoe UI" panose="020B0502040204020203" pitchFamily="34" charset="0"/>
+                          <a:ea typeface="+mn-ea"/>
+                          <a:cs typeface="Segoe UI" panose="020B0502040204020203" pitchFamily="34" charset="0"/>
+                        </a:rPr>
+                        <a:t> (MD)</a:t>
+                      </a:r>
+                      <a:endParaRPr lang="ru-RU" sz="1000" kern="1200" dirty="0">
+                        <a:solidFill>
+                          <a:schemeClr val="tx1"/>
+                        </a:solidFill>
+                        <a:latin typeface="Segoe UI" panose="020B0502040204020203" pitchFamily="34" charset="0"/>
+                        <a:ea typeface="+mn-ea"/>
+                        <a:cs typeface="Segoe UI" panose="020B0502040204020203" pitchFamily="34" charset="0"/>
+                      </a:endParaRPr>
+                    </a:p>
+                  </a:txBody>
+                  <a:tcPr anchor="ctr"/>
+                </a:tc>
+                <a:extLst>
+                  <a:ext uri="{0D108BD9-81ED-4DB2-BD59-A6C34878D82A}">
+                    <a16:rowId xmlns:a16="http://schemas.microsoft.com/office/drawing/2014/main" val="181303"/>
+                  </a:ext>
+                </a:extLst>
+              </a:tr>
+              <a:tr h="274319">
+                <a:tc>
+                  <a:txBody>
+                    <a:bodyPr/>
+                    <a:lstStyle/>
+                    <a:p>
+                      <a:pPr algn="ctr"/>
+                      <a:endParaRPr lang="ru-RU" sz="1000" kern="1200" baseline="0" dirty="0">
+                        <a:solidFill>
+                          <a:schemeClr val="tx1"/>
+                        </a:solidFill>
+                        <a:latin typeface="Segoe UI" panose="020B0502040204020203" pitchFamily="34" charset="0"/>
+                        <a:ea typeface="+mn-ea"/>
+                        <a:cs typeface="Segoe UI" panose="020B0502040204020203" pitchFamily="34" charset="0"/>
+                      </a:endParaRPr>
+                    </a:p>
+                  </a:txBody>
+                  <a:tcPr anchor="ctr"/>
+                </a:tc>
+                <a:tc>
+                  <a:txBody>
+                    <a:bodyPr/>
+                    <a:lstStyle/>
+                    <a:p>
+                      <a:pPr marL="0" algn="ctr" defTabSz="914400" rtl="0" eaLnBrk="1" latinLnBrk="0" hangingPunct="1"/>
+                      <a:endParaRPr lang="ru-RU" sz="1000" kern="1200" baseline="0" dirty="0">
+                        <a:solidFill>
+                          <a:schemeClr val="tx1"/>
+                        </a:solidFill>
+                        <a:latin typeface="Segoe UI" panose="020B0502040204020203" pitchFamily="34" charset="0"/>
+                        <a:ea typeface="+mn-ea"/>
+                        <a:cs typeface="Segoe UI" panose="020B0502040204020203" pitchFamily="34" charset="0"/>
+                      </a:endParaRPr>
+                    </a:p>
+                  </a:txBody>
+                  <a:tcPr anchor="ctr"/>
+                </a:tc>
+                <a:tc>
+                  <a:txBody>
+                    <a:bodyPr/>
+                    <a:lstStyle/>
+                    <a:p>
+                      <a:pPr marL="0" marR="0" indent="0" algn="ctr" defTabSz="914400" rtl="0" eaLnBrk="1" fontAlgn="auto" latinLnBrk="0" hangingPunct="1">
+                        <a:lnSpc>
+                          <a:spcPct val="100000"/>
+                        </a:lnSpc>
+                        <a:spcBef>
+                          <a:spcPts val="0"/>
+                        </a:spcBef>
+                        <a:spcAft>
+                          <a:spcPts val="0"/>
+                        </a:spcAft>
+                        <a:buClrTx/>
+                        <a:buSzTx/>
+                        <a:buFontTx/>
+                        <a:buNone/>
+                        <a:tabLst/>
+                        <a:defRPr/>
+                      </a:pPr>
+                      <a:endParaRPr lang="ru-RU" sz="1000" kern="1200" baseline="0" dirty="0" smtClean="0">
+                        <a:solidFill>
+                          <a:schemeClr val="tx1"/>
+                        </a:solidFill>
+                        <a:latin typeface="Segoe UI" panose="020B0502040204020203" pitchFamily="34" charset="0"/>
+                        <a:ea typeface="+mn-ea"/>
+                        <a:cs typeface="Segoe UI" panose="020B0502040204020203" pitchFamily="34" charset="0"/>
+                      </a:endParaRPr>
+                    </a:p>
+                  </a:txBody>
+                  <a:tcPr anchor="ctr"/>
+                </a:tc>
+                <a:tc>
+                  <a:txBody>
+                    <a:bodyPr/>
+                    <a:lstStyle/>
+                    <a:p>
+                      <a:pPr algn="ctr"/>
+                      <a:endParaRPr lang="en-US" sz="1000" kern="1200" baseline="0" dirty="0" smtClean="0">
+                        <a:solidFill>
+                          <a:schemeClr val="tx1"/>
+                        </a:solidFill>
+                        <a:latin typeface="Segoe UI" panose="020B0502040204020203" pitchFamily="34" charset="0"/>
+                        <a:ea typeface="+mn-ea"/>
+                        <a:cs typeface="Segoe UI" panose="020B0502040204020203" pitchFamily="34" charset="0"/>
+                      </a:endParaRPr>
+                    </a:p>
+                  </a:txBody>
+                  <a:tcPr anchor="ctr"/>
+                </a:tc>
+                <a:extLst>
+                  <a:ext uri="{0D108BD9-81ED-4DB2-BD59-A6C34878D82A}">
+                    <a16:rowId xmlns:a16="http://schemas.microsoft.com/office/drawing/2014/main" val="984699972"/>
+                  </a:ext>
+                </a:extLst>
+              </a:tr>
+            </a:tbl>
+          </a:graphicData>
+        </a:graphic>
+      </p:graphicFrame>
+      <p:sp>
+        <p:nvSpPr>
+          <p:cNvPr id="9" name="Прямоугольник 8"/>
+          <p:cNvSpPr/>
+          <p:nvPr/>
+        </p:nvSpPr>
+        <p:spPr>
+          <a:xfrm>
+            <a:off x="132129" y="1410757"/>
+            <a:ext cx="8900146" cy="830997"/>
+          </a:xfrm>
+          <a:prstGeom prst="rect">
+            <a:avLst/>
+          </a:prstGeom>
+        </p:spPr>
+        <p:txBody>
+          <a:bodyPr wrap="square">
+            <a:spAutoFit/>
+          </a:bodyPr>
+          <a:lstStyle/>
+          <a:p>
+            <a:pPr algn="just"/>
+            <a:r>
+              <a:rPr lang="ru-RU" sz="1200" dirty="0" smtClean="0">
+                <a:latin typeface="Segoe UI" panose="020B0502040204020203" pitchFamily="34" charset="0"/>
+                <a:cs typeface="Segoe UI" panose="020B0502040204020203" pitchFamily="34" charset="0"/>
+              </a:rPr>
+              <a:t>Комментарий:</a:t>
+            </a:r>
+          </a:p>
+          <a:p>
+            <a:r>
+              <a:rPr lang="ru-RU" sz="1200" dirty="0">
+                <a:latin typeface="Segoe UI" panose="020B0502040204020203" pitchFamily="34" charset="0"/>
+                <a:cs typeface="Segoe UI" panose="020B0502040204020203" pitchFamily="34" charset="0"/>
+              </a:rPr>
+              <a:t>Подрядчик по ННБ настроил передачу исходных замеров акселерометров и магнитометров в процессе бурения по протоколу WITS0 в </a:t>
+            </a:r>
+            <a:r>
+              <a:rPr lang="ru-RU" sz="1200" dirty="0" smtClean="0">
+                <a:latin typeface="Segoe UI" panose="020B0502040204020203" pitchFamily="34" charset="0"/>
+                <a:cs typeface="Segoe UI" panose="020B0502040204020203" pitchFamily="34" charset="0"/>
+              </a:rPr>
+              <a:t>интервалах </a:t>
+            </a:r>
+            <a:r>
+              <a:rPr lang="en-US" sz="1200" dirty="0" smtClean="0">
+                <a:latin typeface="Segoe UI" panose="020B0502040204020203" pitchFamily="34" charset="0"/>
+                <a:cs typeface="Segoe UI" panose="020B0502040204020203" pitchFamily="34" charset="0"/>
+              </a:rPr>
+              <a:t>XXXX-XXXX</a:t>
+            </a:r>
+            <a:r>
+              <a:rPr lang="ru-RU" sz="1200" dirty="0" smtClean="0">
+                <a:latin typeface="Segoe UI" panose="020B0502040204020203" pitchFamily="34" charset="0"/>
+                <a:cs typeface="Segoe UI" panose="020B0502040204020203" pitchFamily="34" charset="0"/>
+              </a:rPr>
+              <a:t> м</a:t>
+            </a:r>
+            <a:r>
+              <a:rPr lang="en-US" sz="1200" dirty="0" smtClean="0">
+                <a:latin typeface="Segoe UI" panose="020B0502040204020203" pitchFamily="34" charset="0"/>
+                <a:cs typeface="Segoe UI" panose="020B0502040204020203" pitchFamily="34" charset="0"/>
+              </a:rPr>
+              <a:t>;</a:t>
+            </a:r>
+            <a:r>
+              <a:rPr lang="ru-RU" sz="1200" dirty="0" smtClean="0">
+                <a:latin typeface="Segoe UI" panose="020B0502040204020203" pitchFamily="34" charset="0"/>
+                <a:cs typeface="Segoe UI" panose="020B0502040204020203" pitchFamily="34" charset="0"/>
+              </a:rPr>
+              <a:t> </a:t>
+            </a:r>
+            <a:r>
+              <a:rPr lang="en-US" sz="1200" dirty="0" smtClean="0">
+                <a:latin typeface="Segoe UI" panose="020B0502040204020203" pitchFamily="34" charset="0"/>
+                <a:cs typeface="Segoe UI" panose="020B0502040204020203" pitchFamily="34" charset="0"/>
+              </a:rPr>
+              <a:t>XXXX-XXXX</a:t>
+            </a:r>
+            <a:r>
+              <a:rPr lang="ru-RU" sz="1200" dirty="0" smtClean="0">
+                <a:latin typeface="Segoe UI" panose="020B0502040204020203" pitchFamily="34" charset="0"/>
+                <a:cs typeface="Segoe UI" panose="020B0502040204020203" pitchFamily="34" charset="0"/>
+              </a:rPr>
+              <a:t> м (MD) В интервалах </a:t>
+            </a:r>
+            <a:r>
+              <a:rPr lang="ru-RU" sz="1200" dirty="0">
+                <a:latin typeface="Segoe UI" panose="020B0502040204020203" pitchFamily="34" charset="0"/>
+                <a:cs typeface="Segoe UI" panose="020B0502040204020203" pitchFamily="34" charset="0"/>
+              </a:rPr>
+              <a:t>глубин (MD) </a:t>
+            </a:r>
+            <a:r>
+              <a:rPr lang="en-US" sz="1200" dirty="0" smtClean="0">
+                <a:latin typeface="Segoe UI" panose="020B0502040204020203" pitchFamily="34" charset="0"/>
+                <a:cs typeface="Segoe UI" panose="020B0502040204020203" pitchFamily="34" charset="0"/>
+              </a:rPr>
+              <a:t>XXXX-XXXX; </a:t>
+            </a:r>
+            <a:r>
+              <a:rPr lang="ru-RU" sz="1200" dirty="0" smtClean="0">
+                <a:latin typeface="Segoe UI" panose="020B0502040204020203" pitchFamily="34" charset="0"/>
+                <a:cs typeface="Segoe UI" panose="020B0502040204020203" pitchFamily="34" charset="0"/>
+              </a:rPr>
+              <a:t> </a:t>
+            </a:r>
+            <a:endParaRPr lang="ru-RU" sz="1200" dirty="0">
+              <a:latin typeface="Segoe UI" panose="020B0502040204020203" pitchFamily="34" charset="0"/>
+              <a:cs typeface="Segoe UI" panose="020B0502040204020203" pitchFamily="34" charset="0"/>
+            </a:endParaRPr>
+          </a:p>
+          <a:p>
+            <a:pPr algn="just"/>
+            <a:endParaRPr lang="ru-RU" sz="1200" dirty="0">
+              <a:solidFill>
+                <a:srgbClr val="FF0000"/>
+              </a:solidFill>
+              <a:latin typeface="Segoe UI" panose="020B0502040204020203" pitchFamily="34" charset="0"/>
+              <a:cs typeface="Segoe UI" panose="020B0502040204020203" pitchFamily="34" charset="0"/>
+            </a:endParaRPr>
+          </a:p>
+        </p:txBody>
+      </p:sp>
+    </p:spTree>
+    <p:extLst>
+      <p:ext uri="{BB962C8B-B14F-4D97-AF65-F5344CB8AC3E}">
+        <p14:creationId xmlns:p14="http://schemas.microsoft.com/office/powerpoint/2010/main" val="2541746078"/>
+      </p:ext>
+    </p:extLst>
+  </p:cSld>
+  <p:clrMapOvr>
+    <a:masterClrMapping/>
+  </p:clrMapOvr>
+</p:sld>
+</file>
+
+<file path=ppt/slides/slide7.xml><?xml version="1.0" encoding="utf-8"?>
+<p:sld xmlns:a="http://schemas.openxmlformats.org/drawingml/2006/main" xmlns:r="http://schemas.openxmlformats.org/officeDocument/2006/relationships" xmlns:p="http://schemas.openxmlformats.org/presentationml/2006/main">
+  <p:cSld>
+    <p:spTree>
+      <p:nvGrpSpPr>
+        <p:cNvPr id="1" name=""/>
+        <p:cNvGrpSpPr/>
+        <p:nvPr/>
+      </p:nvGrpSpPr>
+      <p:grpSpPr>
+        <a:xfrm>
+          <a:off x="0" y="0"/>
+          <a:ext cx="0" cy="0"/>
+          <a:chOff x="0" y="0"/>
+          <a:chExt cx="0" cy="0"/>
+        </a:xfrm>
+      </p:grpSpPr>
+      <p:sp>
+        <p:nvSpPr>
           <p:cNvPr id="6" name="Прямоугольник 5"/>
           <p:cNvSpPr/>
           <p:nvPr/>
@@ -12930,7 +13722,7 @@
 </p:sld>
 </file>
 
-<file path=ppt/slides/slide7.xml><?xml version="1.0" encoding="utf-8"?>
+<file path=ppt/slides/slide8.xml><?xml version="1.0" encoding="utf-8"?>
 <p:sld xmlns:a="http://schemas.openxmlformats.org/drawingml/2006/main" xmlns:r="http://schemas.openxmlformats.org/officeDocument/2006/relationships" xmlns:p="http://schemas.openxmlformats.org/presentationml/2006/main">
   <p:cSld>
     <p:spTree>

</xml_diff>

<commit_message>
update samotlo pptx and copy in byfer obmena
</commit_message>
<xml_diff>
--- a/files/Шаблон/Самотлорское_итоговый.pptx
+++ b/files/Шаблон/Самотлорское_итоговый.pptx
@@ -11,7 +11,7 @@
     <p:handoutMasterId r:id="rId11"/>
   </p:handoutMasterIdLst>
   <p:sldIdLst>
-    <p:sldId id="283" r:id="rId2"/>
+    <p:sldId id="304" r:id="rId2"/>
     <p:sldId id="291" r:id="rId3"/>
     <p:sldId id="302" r:id="rId4"/>
     <p:sldId id="301" r:id="rId5"/>
@@ -272,7 +272,7 @@
               <a:pPr>
                 <a:defRPr/>
               </a:pPr>
-              <a:t>15.07.2024</a:t>
+              <a:t>11.09.2024</a:t>
             </a:fld>
             <a:endParaRPr lang="ru-RU" altLang="ru-RU"/>
           </a:p>
@@ -918,7 +918,7 @@
     </p:spTree>
     <p:extLst>
       <p:ext uri="{BB962C8B-B14F-4D97-AF65-F5344CB8AC3E}">
-        <p14:creationId xmlns:p14="http://schemas.microsoft.com/office/powerpoint/2010/main" val="3838854981"/>
+        <p14:creationId xmlns:p14="http://schemas.microsoft.com/office/powerpoint/2010/main" val="3356002284"/>
       </p:ext>
     </p:extLst>
   </p:cSld>
@@ -6937,7 +6937,29 @@
                 <a:ea typeface="Arial Unicode MS" panose="020B0604020202020204" pitchFamily="34" charset="-128"/>
                 <a:cs typeface="Segoe UI" panose="020B0502040204020203" pitchFamily="34" charset="0"/>
               </a:rPr>
-              <a:t>Заместитель начальника управления геологического                               </a:t>
+              <a:t>Начальник отдела.</a:t>
+            </a:r>
+          </a:p>
+          <a:p>
+            <a:pPr eaLnBrk="1" hangingPunct="1"/>
+            <a:r>
+              <a:rPr lang="ru-RU" altLang="ru-RU" sz="1000" dirty="0">
+                <a:latin typeface="Segoe UI" panose="020B0502040204020203" pitchFamily="34" charset="0"/>
+                <a:ea typeface="Arial Unicode MS" panose="020B0604020202020204" pitchFamily="34" charset="-128"/>
+                <a:cs typeface="Segoe UI" panose="020B0502040204020203" pitchFamily="34" charset="0"/>
+              </a:rPr>
+              <a:t>Отдел геологического сопровождения</a:t>
+            </a:r>
+          </a:p>
+          <a:p>
+            <a:pPr eaLnBrk="1" hangingPunct="1"/>
+            <a:r>
+              <a:rPr lang="ru-RU" altLang="ru-RU" sz="1000" dirty="0">
+                <a:latin typeface="Segoe UI" panose="020B0502040204020203" pitchFamily="34" charset="0"/>
+                <a:ea typeface="Arial Unicode MS" panose="020B0604020202020204" pitchFamily="34" charset="-128"/>
+                <a:cs typeface="Segoe UI" panose="020B0502040204020203" pitchFamily="34" charset="0"/>
+              </a:rPr>
+              <a:t>ЭБ и ЗБС</a:t>
             </a:r>
             <a:br>
               <a:rPr lang="ru-RU" altLang="ru-RU" sz="1000" dirty="0">
@@ -6952,7 +6974,34 @@
                 <a:ea typeface="Arial Unicode MS" panose="020B0604020202020204" pitchFamily="34" charset="-128"/>
                 <a:cs typeface="Segoe UI" panose="020B0502040204020203" pitchFamily="34" charset="0"/>
               </a:rPr>
-              <a:t>сопровождения </a:t>
+              <a:t>АО «Самотлорнефтегаз»</a:t>
+            </a:r>
+          </a:p>
+          <a:p>
+            <a:pPr eaLnBrk="1" hangingPunct="1"/>
+            <a:endParaRPr lang="en-US" altLang="ru-RU" sz="1000" dirty="0" smtClean="0">
+              <a:latin typeface="Segoe UI" panose="020B0502040204020203" pitchFamily="34" charset="0"/>
+              <a:ea typeface="Arial Unicode MS" panose="020B0604020202020204" pitchFamily="34" charset="-128"/>
+              <a:cs typeface="Segoe UI" panose="020B0502040204020203" pitchFamily="34" charset="0"/>
+            </a:endParaRPr>
+          </a:p>
+          <a:p>
+            <a:pPr eaLnBrk="1" hangingPunct="1"/>
+            <a:endParaRPr lang="en-US" altLang="ru-RU" sz="1000" dirty="0">
+              <a:latin typeface="Segoe UI" panose="020B0502040204020203" pitchFamily="34" charset="0"/>
+              <a:ea typeface="Arial Unicode MS" panose="020B0604020202020204" pitchFamily="34" charset="-128"/>
+              <a:cs typeface="Segoe UI" panose="020B0502040204020203" pitchFamily="34" charset="0"/>
+            </a:endParaRPr>
+          </a:p>
+          <a:p>
+            <a:pPr eaLnBrk="1" hangingPunct="1"/>
+            <a:r>
+              <a:rPr lang="ru-RU" altLang="ru-RU" sz="1000" dirty="0">
+                <a:latin typeface="Segoe UI" panose="020B0502040204020203" pitchFamily="34" charset="0"/>
+                <a:ea typeface="Arial Unicode MS" panose="020B0604020202020204" pitchFamily="34" charset="-128"/>
+                <a:cs typeface="Segoe UI" panose="020B0502040204020203" pitchFamily="34" charset="0"/>
+              </a:rPr>
+              <a:t/>
             </a:r>
             <a:br>
               <a:rPr lang="ru-RU" altLang="ru-RU" sz="1000" dirty="0">
@@ -6962,66 +7011,34 @@
               </a:rPr>
             </a:br>
             <a:r>
+              <a:rPr lang="ru-RU" altLang="ru-RU" sz="1000" dirty="0" err="1">
+                <a:latin typeface="Segoe UI" panose="020B0502040204020203" pitchFamily="34" charset="0"/>
+                <a:ea typeface="Arial Unicode MS" panose="020B0604020202020204" pitchFamily="34" charset="-128"/>
+                <a:cs typeface="Segoe UI" panose="020B0502040204020203" pitchFamily="34" charset="0"/>
+              </a:rPr>
+              <a:t>Табатчиков</a:t>
+            </a:r>
+            <a:r>
               <a:rPr lang="ru-RU" altLang="ru-RU" sz="1000" dirty="0">
                 <a:latin typeface="Segoe UI" panose="020B0502040204020203" pitchFamily="34" charset="0"/>
                 <a:ea typeface="Arial Unicode MS" panose="020B0604020202020204" pitchFamily="34" charset="-128"/>
                 <a:cs typeface="Segoe UI" panose="020B0502040204020203" pitchFamily="34" charset="0"/>
               </a:rPr>
-              <a:t>бурения скважин </a:t>
-            </a:r>
-            <a:br>
-              <a:rPr lang="ru-RU" altLang="ru-RU" sz="1000" dirty="0">
+              <a:t> Ю.А. </a:t>
+            </a:r>
+            <a:r>
+              <a:rPr lang="ru-RU" altLang="ru-RU" sz="1000" dirty="0" smtClean="0">
                 <a:latin typeface="Segoe UI" panose="020B0502040204020203" pitchFamily="34" charset="0"/>
                 <a:ea typeface="Arial Unicode MS" panose="020B0604020202020204" pitchFamily="34" charset="-128"/>
                 <a:cs typeface="Segoe UI" panose="020B0502040204020203" pitchFamily="34" charset="0"/>
               </a:rPr>
-            </a:br>
-            <a:r>
-              <a:rPr lang="ru-RU" altLang="ru-RU" sz="1000" dirty="0">
-                <a:latin typeface="Segoe UI" panose="020B0502040204020203" pitchFamily="34" charset="0"/>
-                <a:ea typeface="Arial Unicode MS" panose="020B0604020202020204" pitchFamily="34" charset="-128"/>
-                <a:cs typeface="Segoe UI" panose="020B0502040204020203" pitchFamily="34" charset="0"/>
-              </a:rPr>
-              <a:t>АО «Самотлорнефтегаз»</a:t>
-            </a:r>
-            <a:br>
-              <a:rPr lang="ru-RU" altLang="ru-RU" sz="1000" dirty="0">
-                <a:latin typeface="Segoe UI" panose="020B0502040204020203" pitchFamily="34" charset="0"/>
-                <a:ea typeface="Arial Unicode MS" panose="020B0604020202020204" pitchFamily="34" charset="-128"/>
-                <a:cs typeface="Segoe UI" panose="020B0502040204020203" pitchFamily="34" charset="0"/>
-              </a:rPr>
-            </a:br>
+              <a:t>_________</a:t>
+            </a:r>
             <a:endParaRPr lang="ru-RU" altLang="ru-RU" sz="1000" dirty="0">
               <a:latin typeface="Segoe UI" panose="020B0502040204020203" pitchFamily="34" charset="0"/>
               <a:ea typeface="Arial Unicode MS" panose="020B0604020202020204" pitchFamily="34" charset="-128"/>
               <a:cs typeface="Segoe UI" panose="020B0502040204020203" pitchFamily="34" charset="0"/>
             </a:endParaRPr>
-          </a:p>
-          <a:p>
-            <a:pPr eaLnBrk="1" hangingPunct="1"/>
-            <a:r>
-              <a:rPr lang="ru-RU" altLang="ru-RU" sz="1000" dirty="0">
-                <a:latin typeface="Segoe UI" panose="020B0502040204020203" pitchFamily="34" charset="0"/>
-                <a:ea typeface="Arial Unicode MS" panose="020B0604020202020204" pitchFamily="34" charset="-128"/>
-                <a:cs typeface="Segoe UI" panose="020B0502040204020203" pitchFamily="34" charset="0"/>
-              </a:rPr>
-              <a:t/>
-            </a:r>
-            <a:br>
-              <a:rPr lang="ru-RU" altLang="ru-RU" sz="1000" dirty="0">
-                <a:latin typeface="Segoe UI" panose="020B0502040204020203" pitchFamily="34" charset="0"/>
-                <a:ea typeface="Arial Unicode MS" panose="020B0604020202020204" pitchFamily="34" charset="-128"/>
-                <a:cs typeface="Segoe UI" panose="020B0502040204020203" pitchFamily="34" charset="0"/>
-              </a:rPr>
-            </a:br>
-            <a:r>
-              <a:rPr lang="ru-RU" altLang="ru-RU" sz="1000" dirty="0">
-                <a:latin typeface="Segoe UI" panose="020B0502040204020203" pitchFamily="34" charset="0"/>
-                <a:ea typeface="Arial Unicode MS" panose="020B0604020202020204" pitchFamily="34" charset="-128"/>
-                <a:cs typeface="Segoe UI" panose="020B0502040204020203" pitchFamily="34" charset="0"/>
-              </a:rPr>
-              <a:t>Усов И.А. _________</a:t>
-            </a:r>
           </a:p>
         </p:txBody>
       </p:sp>
@@ -7231,11 +7248,7 @@
             <a:graphicFrameLocks noGrp="1"/>
           </p:cNvGraphicFramePr>
           <p:nvPr>
-            <p:extLst>
-              <p:ext uri="{D42A27DB-BD31-4B8C-83A1-F6EECF244321}">
-                <p14:modId xmlns:p14="http://schemas.microsoft.com/office/powerpoint/2010/main" val="1792817954"/>
-              </p:ext>
-            </p:extLst>
+            <p:extLst/>
           </p:nvPr>
         </p:nvGraphicFramePr>
         <p:xfrm>
@@ -7627,6 +7640,11 @@
         </a:graphic>
       </p:graphicFrame>
     </p:spTree>
+    <p:extLst>
+      <p:ext uri="{BB962C8B-B14F-4D97-AF65-F5344CB8AC3E}">
+        <p14:creationId xmlns:p14="http://schemas.microsoft.com/office/powerpoint/2010/main" val="2989874922"/>
+      </p:ext>
+    </p:extLst>
   </p:cSld>
   <p:clrMapOvr>
     <a:masterClrMapping/>
@@ -12944,19 +12962,105 @@
           </a:p>
         </p:txBody>
       </p:sp>
+      <p:sp>
+        <p:nvSpPr>
+          <p:cNvPr id="9" name="Прямоугольник 8"/>
+          <p:cNvSpPr/>
+          <p:nvPr/>
+        </p:nvSpPr>
+        <p:spPr>
+          <a:xfrm>
+            <a:off x="132129" y="1410757"/>
+            <a:ext cx="8900146" cy="830997"/>
+          </a:xfrm>
+          <a:prstGeom prst="rect">
+            <a:avLst/>
+          </a:prstGeom>
+        </p:spPr>
+        <p:txBody>
+          <a:bodyPr wrap="square">
+            <a:spAutoFit/>
+          </a:bodyPr>
+          <a:lstStyle/>
+          <a:p>
+            <a:pPr algn="just"/>
+            <a:r>
+              <a:rPr lang="ru-RU" sz="1200" dirty="0">
+                <a:latin typeface="Segoe UI" panose="020B0502040204020203" pitchFamily="34" charset="0"/>
+                <a:cs typeface="Segoe UI" panose="020B0502040204020203" pitchFamily="34" charset="0"/>
+              </a:rPr>
+              <a:t>Комментарий:</a:t>
+            </a:r>
+          </a:p>
+          <a:p>
+            <a:r>
+              <a:rPr lang="ru-RU" sz="1200" dirty="0">
+                <a:latin typeface="Segoe UI" panose="020B0502040204020203" pitchFamily="34" charset="0"/>
+                <a:cs typeface="Segoe UI" panose="020B0502040204020203" pitchFamily="34" charset="0"/>
+              </a:rPr>
+              <a:t>Подрядная организация по ННБ настроила передачу исходных замеров акселерометров и магнитометров в процессе бурения по протоколу </a:t>
+            </a:r>
+            <a:r>
+              <a:rPr lang="en-US" sz="1200" dirty="0">
+                <a:latin typeface="Segoe UI" panose="020B0502040204020203" pitchFamily="34" charset="0"/>
+                <a:cs typeface="Segoe UI" panose="020B0502040204020203" pitchFamily="34" charset="0"/>
+              </a:rPr>
+              <a:t>WITS0</a:t>
+            </a:r>
+            <a:r>
+              <a:rPr lang="ru-RU" sz="1200" dirty="0">
+                <a:latin typeface="Segoe UI" panose="020B0502040204020203" pitchFamily="34" charset="0"/>
+                <a:cs typeface="Segoe UI" panose="020B0502040204020203" pitchFamily="34" charset="0"/>
+              </a:rPr>
+              <a:t> в полном объеме в рамках рейса …. По рейсу … данные не передавались </a:t>
+            </a:r>
+            <a:r>
+              <a:rPr lang="ru-RU" sz="1200" dirty="0">
+                <a:solidFill>
+                  <a:srgbClr val="FF0000"/>
+                </a:solidFill>
+                <a:latin typeface="Segoe UI" panose="020B0502040204020203" pitchFamily="34" charset="0"/>
+                <a:cs typeface="Segoe UI" panose="020B0502040204020203" pitchFamily="34" charset="0"/>
+              </a:rPr>
+              <a:t>(и т.д. в зависимости от ситуации</a:t>
+            </a:r>
+            <a:r>
+              <a:rPr lang="ru-RU" sz="1200" dirty="0" smtClean="0">
+                <a:solidFill>
+                  <a:srgbClr val="FF0000"/>
+                </a:solidFill>
+                <a:latin typeface="Segoe UI" panose="020B0502040204020203" pitchFamily="34" charset="0"/>
+                <a:cs typeface="Segoe UI" panose="020B0502040204020203" pitchFamily="34" charset="0"/>
+              </a:rPr>
+              <a:t>)</a:t>
+            </a:r>
+            <a:endParaRPr lang="ru-RU" sz="1200" dirty="0">
+              <a:solidFill>
+                <a:srgbClr val="FF0000"/>
+              </a:solidFill>
+              <a:latin typeface="Segoe UI" panose="020B0502040204020203" pitchFamily="34" charset="0"/>
+              <a:cs typeface="Segoe UI" panose="020B0502040204020203" pitchFamily="34" charset="0"/>
+            </a:endParaRPr>
+          </a:p>
+        </p:txBody>
+      </p:sp>
       <p:graphicFrame>
         <p:nvGraphicFramePr>
-          <p:cNvPr id="3" name="Таблица 2"/>
+          <p:cNvPr id="7" name="Таблица 6"/>
           <p:cNvGraphicFramePr>
             <a:graphicFrameLocks noGrp="1"/>
           </p:cNvGraphicFramePr>
           <p:nvPr>
-            <p:extLst/>
+            <p:extLst>
+              <p:ext uri="{D42A27DB-BD31-4B8C-83A1-F6EECF244321}">
+                <p14:modId xmlns:p14="http://schemas.microsoft.com/office/powerpoint/2010/main" val="3720400815"/>
+              </p:ext>
+            </p:extLst>
           </p:nvPr>
         </p:nvGraphicFramePr>
         <p:xfrm>
           <a:off x="155575" y="658561"/>
-          <a:ext cx="8853254" cy="548638"/>
+          <a:ext cx="8942389" cy="548638"/>
         </p:xfrm>
         <a:graphic>
           <a:graphicData uri="http://schemas.openxmlformats.org/drawingml/2006/table">
@@ -12965,31 +13069,24 @@
                 <a:tableStyleId>{5940675A-B579-460E-94D1-54222C63F5DA}</a:tableStyleId>
               </a:tblPr>
               <a:tblGrid>
-                <a:gridCol w="2738700">
+                <a:gridCol w="3807558">
                   <a:extLst>
                     <a:ext uri="{9D8B030D-6E8A-4147-A177-3AD203B41FA5}">
                       <a16:colId xmlns:a16="http://schemas.microsoft.com/office/drawing/2014/main" val="2391148262"/>
                     </a:ext>
                   </a:extLst>
                 </a:gridCol>
-                <a:gridCol w="1725433">
+                <a:gridCol w="2398834">
                   <a:extLst>
                     <a:ext uri="{9D8B030D-6E8A-4147-A177-3AD203B41FA5}">
                       <a16:colId xmlns:a16="http://schemas.microsoft.com/office/drawing/2014/main" val="337475581"/>
                     </a:ext>
                   </a:extLst>
                 </a:gridCol>
-                <a:gridCol w="1967948">
+                <a:gridCol w="2735997">
                   <a:extLst>
                     <a:ext uri="{9D8B030D-6E8A-4147-A177-3AD203B41FA5}">
                       <a16:colId xmlns:a16="http://schemas.microsoft.com/office/drawing/2014/main" val="1703225629"/>
-                    </a:ext>
-                  </a:extLst>
-                </a:gridCol>
-                <a:gridCol w="2421173">
-                  <a:extLst>
-                    <a:ext uri="{9D8B030D-6E8A-4147-A177-3AD203B41FA5}">
-                      <a16:colId xmlns:a16="http://schemas.microsoft.com/office/drawing/2014/main" val="3491107632"/>
                     </a:ext>
                   </a:extLst>
                 </a:gridCol>
@@ -13005,28 +13102,7 @@
                           <a:latin typeface="Segoe UI" panose="020B0502040204020203" pitchFamily="34" charset="0"/>
                           <a:cs typeface="Segoe UI" panose="020B0502040204020203" pitchFamily="34" charset="0"/>
                         </a:rPr>
-                        <a:t>Интервал предоставления</a:t>
-                      </a:r>
-                      <a:r>
-                        <a:rPr lang="ru-RU" sz="1000" baseline="0" dirty="0" smtClean="0">
-                          <a:latin typeface="Segoe UI" panose="020B0502040204020203" pitchFamily="34" charset="0"/>
-                          <a:cs typeface="Segoe UI" panose="020B0502040204020203" pitchFamily="34" charset="0"/>
-                        </a:rPr>
-                        <a:t> данных</a:t>
-                      </a:r>
-                      <a:r>
-                        <a:rPr lang="ru-RU" sz="1000" dirty="0" smtClean="0">
-                          <a:latin typeface="Segoe UI" panose="020B0502040204020203" pitchFamily="34" charset="0"/>
-                          <a:cs typeface="Segoe UI" panose="020B0502040204020203" pitchFamily="34" charset="0"/>
-                        </a:rPr>
-                        <a:t>, м</a:t>
-                      </a:r>
-                      <a:r>
-                        <a:rPr lang="en-US" sz="1000" dirty="0" smtClean="0">
-                          <a:latin typeface="Segoe UI" panose="020B0502040204020203" pitchFamily="34" charset="0"/>
-                          <a:cs typeface="Segoe UI" panose="020B0502040204020203" pitchFamily="34" charset="0"/>
-                        </a:rPr>
-                        <a:t> (MD)</a:t>
+                        <a:t>Полнота предоставления данных</a:t>
                       </a:r>
                       <a:endParaRPr lang="ru-RU" sz="1000" dirty="0">
                         <a:latin typeface="Segoe UI" panose="020B0502040204020203" pitchFamily="34" charset="0"/>
@@ -13094,46 +13170,6 @@
                   </a:txBody>
                   <a:tcPr anchor="ctr"/>
                 </a:tc>
-                <a:tc>
-                  <a:txBody>
-                    <a:bodyPr/>
-                    <a:lstStyle/>
-                    <a:p>
-                      <a:pPr marL="0" algn="l" defTabSz="914400" rtl="0" eaLnBrk="1" latinLnBrk="0" hangingPunct="1"/>
-                      <a:r>
-                        <a:rPr lang="ru-RU" sz="1000" kern="1200" dirty="0" smtClean="0">
-                          <a:solidFill>
-                            <a:schemeClr val="tx1"/>
-                          </a:solidFill>
-                          <a:latin typeface="Segoe UI" panose="020B0502040204020203" pitchFamily="34" charset="0"/>
-                          <a:ea typeface="+mn-ea"/>
-                          <a:cs typeface="Segoe UI" panose="020B0502040204020203" pitchFamily="34" charset="0"/>
-                        </a:rPr>
-                        <a:t>Интервал отсутствия данных, м</a:t>
-                      </a:r>
-                      <a:r>
-                        <a:rPr lang="en-US" sz="1000" kern="1200" dirty="0" smtClean="0">
-                          <a:solidFill>
-                            <a:schemeClr val="tx1"/>
-                          </a:solidFill>
-                          <a:latin typeface="Segoe UI" panose="020B0502040204020203" pitchFamily="34" charset="0"/>
-                          <a:ea typeface="+mn-ea"/>
-                          <a:cs typeface="Segoe UI" panose="020B0502040204020203" pitchFamily="34" charset="0"/>
-                        </a:rPr>
-                        <a:t> (MD)</a:t>
-                      </a:r>
-                      <a:endParaRPr lang="ru-RU" sz="1000" kern="1200" dirty="0">
-                        <a:solidFill>
-                          <a:schemeClr val="tx1"/>
-                        </a:solidFill>
-                        <a:latin typeface="Segoe UI" panose="020B0502040204020203" pitchFamily="34" charset="0"/>
-                        <a:ea typeface="+mn-ea"/>
-                        <a:cs typeface="Segoe UI" panose="020B0502040204020203" pitchFamily="34" charset="0"/>
-                      </a:endParaRPr>
-                    </a:p>
-                  </a:txBody>
-                  <a:tcPr anchor="ctr"/>
-                </a:tc>
                 <a:extLst>
                   <a:ext uri="{0D108BD9-81ED-4DB2-BD59-A6C34878D82A}">
                     <a16:rowId xmlns:a16="http://schemas.microsoft.com/office/drawing/2014/main" val="181303"/>
@@ -13146,7 +13182,18 @@
                     <a:bodyPr/>
                     <a:lstStyle/>
                     <a:p>
-                      <a:pPr algn="ctr"/>
+                      <a:pPr algn="l"/>
+                      <a:r>
+                        <a:rPr lang="ru-RU" sz="1000" kern="1200" baseline="0" dirty="0" smtClean="0">
+                          <a:solidFill>
+                            <a:schemeClr val="tx1"/>
+                          </a:solidFill>
+                          <a:latin typeface="Segoe UI" panose="020B0502040204020203" pitchFamily="34" charset="0"/>
+                          <a:ea typeface="+mn-ea"/>
+                          <a:cs typeface="Segoe UI" panose="020B0502040204020203" pitchFamily="34" charset="0"/>
+                        </a:rPr>
+                        <a:t>В полном объеме/ частичное предоставление данных</a:t>
+                      </a:r>
                       <a:endParaRPr lang="ru-RU" sz="1000" kern="1200" baseline="0" dirty="0">
                         <a:solidFill>
                           <a:schemeClr val="tx1"/>
@@ -13211,24 +13258,6 @@
                   </a:txBody>
                   <a:tcPr anchor="ctr"/>
                 </a:tc>
-                <a:tc>
-                  <a:txBody>
-                    <a:bodyPr/>
-                    <a:lstStyle/>
-                    <a:p>
-                      <a:pPr algn="ctr"/>
-                      <a:endParaRPr lang="en-US" sz="1000" kern="1200" baseline="0" dirty="0" smtClean="0">
-                        <a:solidFill>
-                          <a:schemeClr val="tx1"/>
-                        </a:solidFill>
-                        <a:latin typeface="Segoe UI" panose="020B0502040204020203" pitchFamily="34" charset="0"/>
-                        <a:ea typeface="+mn-ea"/>
-                        <a:cs typeface="Segoe UI" panose="020B0502040204020203" pitchFamily="34" charset="0"/>
-                      </a:endParaRPr>
-                    </a:p>
-                  </a:txBody>
-                  <a:tcPr anchor="ctr"/>
-                </a:tc>
                 <a:extLst>
                   <a:ext uri="{0D108BD9-81ED-4DB2-BD59-A6C34878D82A}">
                     <a16:rowId xmlns:a16="http://schemas.microsoft.com/office/drawing/2014/main" val="984699972"/>
@@ -13239,131 +13268,6 @@
           </a:graphicData>
         </a:graphic>
       </p:graphicFrame>
-      <p:sp>
-        <p:nvSpPr>
-          <p:cNvPr id="9" name="Прямоугольник 8"/>
-          <p:cNvSpPr/>
-          <p:nvPr/>
-        </p:nvSpPr>
-        <p:spPr>
-          <a:xfrm>
-            <a:off x="132129" y="1410757"/>
-            <a:ext cx="8900146" cy="830997"/>
-          </a:xfrm>
-          <a:prstGeom prst="rect">
-            <a:avLst/>
-          </a:prstGeom>
-        </p:spPr>
-        <p:txBody>
-          <a:bodyPr wrap="square">
-            <a:spAutoFit/>
-          </a:bodyPr>
-          <a:lstStyle/>
-          <a:p>
-            <a:pPr algn="just"/>
-            <a:r>
-              <a:rPr lang="ru-RU" sz="1200" dirty="0" smtClean="0">
-                <a:latin typeface="Segoe UI" panose="020B0502040204020203" pitchFamily="34" charset="0"/>
-                <a:cs typeface="Segoe UI" panose="020B0502040204020203" pitchFamily="34" charset="0"/>
-              </a:rPr>
-              <a:t>Комментарий:</a:t>
-            </a:r>
-          </a:p>
-          <a:p>
-            <a:r>
-              <a:rPr lang="ru-RU" sz="1200" dirty="0">
-                <a:latin typeface="Segoe UI" panose="020B0502040204020203" pitchFamily="34" charset="0"/>
-                <a:cs typeface="Segoe UI" panose="020B0502040204020203" pitchFamily="34" charset="0"/>
-              </a:rPr>
-              <a:t>Подрядчик по ННБ настроил передачу исходных замеров акселерометров и магнитометров в процессе бурения по протоколу WITS0 в </a:t>
-            </a:r>
-            <a:r>
-              <a:rPr lang="ru-RU" sz="1200" dirty="0" smtClean="0">
-                <a:latin typeface="Segoe UI" panose="020B0502040204020203" pitchFamily="34" charset="0"/>
-                <a:cs typeface="Segoe UI" panose="020B0502040204020203" pitchFamily="34" charset="0"/>
-              </a:rPr>
-              <a:t>интервалах </a:t>
-            </a:r>
-            <a:r>
-              <a:rPr lang="en-US" sz="1200" dirty="0" smtClean="0">
-                <a:latin typeface="Segoe UI" panose="020B0502040204020203" pitchFamily="34" charset="0"/>
-                <a:cs typeface="Segoe UI" panose="020B0502040204020203" pitchFamily="34" charset="0"/>
-              </a:rPr>
-              <a:t>XXXX-XXXX</a:t>
-            </a:r>
-            <a:r>
-              <a:rPr lang="ru-RU" sz="1200" dirty="0" smtClean="0">
-                <a:latin typeface="Segoe UI" panose="020B0502040204020203" pitchFamily="34" charset="0"/>
-                <a:cs typeface="Segoe UI" panose="020B0502040204020203" pitchFamily="34" charset="0"/>
-              </a:rPr>
-              <a:t> м</a:t>
-            </a:r>
-            <a:r>
-              <a:rPr lang="en-US" sz="1200" dirty="0" smtClean="0">
-                <a:latin typeface="Segoe UI" panose="020B0502040204020203" pitchFamily="34" charset="0"/>
-                <a:cs typeface="Segoe UI" panose="020B0502040204020203" pitchFamily="34" charset="0"/>
-              </a:rPr>
-              <a:t>;</a:t>
-            </a:r>
-            <a:r>
-              <a:rPr lang="ru-RU" sz="1200" dirty="0" smtClean="0">
-                <a:latin typeface="Segoe UI" panose="020B0502040204020203" pitchFamily="34" charset="0"/>
-                <a:cs typeface="Segoe UI" panose="020B0502040204020203" pitchFamily="34" charset="0"/>
-              </a:rPr>
-              <a:t> </a:t>
-            </a:r>
-            <a:r>
-              <a:rPr lang="en-US" sz="1200" dirty="0" smtClean="0">
-                <a:latin typeface="Segoe UI" panose="020B0502040204020203" pitchFamily="34" charset="0"/>
-                <a:cs typeface="Segoe UI" panose="020B0502040204020203" pitchFamily="34" charset="0"/>
-              </a:rPr>
-              <a:t>XXXX-XXXX</a:t>
-            </a:r>
-            <a:r>
-              <a:rPr lang="ru-RU" sz="1200" dirty="0" smtClean="0">
-                <a:latin typeface="Segoe UI" panose="020B0502040204020203" pitchFamily="34" charset="0"/>
-                <a:cs typeface="Segoe UI" panose="020B0502040204020203" pitchFamily="34" charset="0"/>
-              </a:rPr>
-              <a:t> м (MD) В интервалах </a:t>
-            </a:r>
-            <a:r>
-              <a:rPr lang="ru-RU" sz="1200" dirty="0">
-                <a:latin typeface="Segoe UI" panose="020B0502040204020203" pitchFamily="34" charset="0"/>
-                <a:cs typeface="Segoe UI" panose="020B0502040204020203" pitchFamily="34" charset="0"/>
-              </a:rPr>
-              <a:t>глубин (MD) </a:t>
-            </a:r>
-            <a:r>
-              <a:rPr lang="en-US" sz="1200" dirty="0" smtClean="0">
-                <a:latin typeface="Segoe UI" panose="020B0502040204020203" pitchFamily="34" charset="0"/>
-                <a:cs typeface="Segoe UI" panose="020B0502040204020203" pitchFamily="34" charset="0"/>
-              </a:rPr>
-              <a:t>XXXX-XXXX; </a:t>
-            </a:r>
-            <a:r>
-              <a:rPr lang="ru-RU" sz="1200" dirty="0" smtClean="0">
-                <a:latin typeface="Segoe UI" panose="020B0502040204020203" pitchFamily="34" charset="0"/>
-                <a:cs typeface="Segoe UI" panose="020B0502040204020203" pitchFamily="34" charset="0"/>
-              </a:rPr>
-              <a:t> </a:t>
-            </a:r>
-            <a:endParaRPr lang="ru-RU" sz="1200" dirty="0">
-              <a:latin typeface="Segoe UI" panose="020B0502040204020203" pitchFamily="34" charset="0"/>
-              <a:cs typeface="Segoe UI" panose="020B0502040204020203" pitchFamily="34" charset="0"/>
-            </a:endParaRPr>
-          </a:p>
-          <a:p>
-            <a:pPr algn="just"/>
-            <a:endParaRPr lang="ru-RU" sz="1200" dirty="0">
-              <a:solidFill>
-                <a:srgbClr val="FF0000"/>
-              </a:solidFill>
-              <a:latin typeface="Segoe UI" panose="020B0502040204020203" pitchFamily="34" charset="0"/>
-              <a:cs typeface="Segoe UI" panose="020B0502040204020203" pitchFamily="34" charset="0"/>
-            </a:endParaRPr>
-          </a:p>
-        </p:txBody>
-      </p:sp>
     </p:spTree>
     <p:extLst>
       <p:ext uri="{BB962C8B-B14F-4D97-AF65-F5344CB8AC3E}">
@@ -14186,7 +14090,7 @@
         <p:spPr>
           <a:xfrm>
             <a:off x="220726" y="4347566"/>
-            <a:ext cx="8831206" cy="1677382"/>
+            <a:ext cx="8831206" cy="1627561"/>
           </a:xfrm>
           <a:prstGeom prst="rect">
             <a:avLst/>
@@ -14199,7 +14103,7 @@
           <a:lstStyle/>
           <a:p>
             <a:r>
-              <a:rPr lang="ru-RU" sz="1300" b="1" dirty="0">
+              <a:rPr lang="ru-RU" sz="1200" b="1" dirty="0">
                 <a:latin typeface="Segoe UI" panose="020B0502040204020203" pitchFamily="34" charset="0"/>
                 <a:cs typeface="Segoe UI" panose="020B0502040204020203" pitchFamily="34" charset="0"/>
               </a:rPr>
@@ -14222,7 +14126,7 @@
                 <a:latin typeface="Segoe UI" panose="020B0502040204020203" pitchFamily="34" charset="0"/>
                 <a:cs typeface="Segoe UI" panose="020B0502040204020203" pitchFamily="34" charset="0"/>
               </a:rPr>
-              <a:t>Расчёт и использование поправки на прогиб КНБК</a:t>
+              <a:t>Использование приборов с актуальными калибровками с контролем корректности функционирования инклинометров в скважинных условиях</a:t>
             </a:r>
             <a:r>
               <a:rPr lang="en-US" sz="1200" dirty="0">
@@ -14252,19 +14156,8 @@
                 <a:latin typeface="Segoe UI" panose="020B0502040204020203" pitchFamily="34" charset="0"/>
                 <a:cs typeface="Segoe UI" panose="020B0502040204020203" pitchFamily="34" charset="0"/>
               </a:rPr>
-              <a:t>Контроль работы прибора инклинометрии и использование приборов с актуальными калибровками</a:t>
-            </a:r>
-            <a:r>
-              <a:rPr lang="en-US" sz="1200" dirty="0">
-                <a:latin typeface="Segoe UI" panose="020B0502040204020203" pitchFamily="34" charset="0"/>
-                <a:cs typeface="Segoe UI" panose="020B0502040204020203" pitchFamily="34" charset="0"/>
-              </a:rPr>
-              <a:t>;</a:t>
-            </a:r>
-            <a:endParaRPr lang="ru-RU" sz="1200" dirty="0">
-              <a:latin typeface="Segoe UI" panose="020B0502040204020203" pitchFamily="34" charset="0"/>
-              <a:cs typeface="Segoe UI" panose="020B0502040204020203" pitchFamily="34" charset="0"/>
-            </a:endParaRPr>
+              <a:t>Запрет на использование проблемных инклинометров до предоставления результатов поверочных/калибровочных работ;</a:t>
+            </a:r>
           </a:p>
           <a:p>
             <a:pPr marL="285750" indent="-285750">
@@ -14310,44 +14203,21 @@
                 <a:latin typeface="Segoe UI" panose="020B0502040204020203" pitchFamily="34" charset="0"/>
                 <a:cs typeface="Segoe UI" panose="020B0502040204020203" pitchFamily="34" charset="0"/>
               </a:rPr>
-              <a:t> для проверки прибора инклинометрии</a:t>
-            </a:r>
-            <a:r>
-              <a:rPr lang="en-US" sz="1200" dirty="0">
+              <a:t> для проверки работоспособности прибора </a:t>
+            </a:r>
+            <a:r>
+              <a:rPr lang="ru-RU" sz="1200" dirty="0" err="1">
+                <a:latin typeface="Segoe UI" panose="020B0502040204020203" pitchFamily="34" charset="0"/>
+                <a:cs typeface="Segoe UI" panose="020B0502040204020203" pitchFamily="34" charset="0"/>
+              </a:rPr>
+              <a:t>инклинометрии</a:t>
+            </a:r>
+            <a:r>
+              <a:rPr lang="en-US" sz="1200" dirty="0" smtClean="0">
                 <a:latin typeface="Segoe UI" panose="020B0502040204020203" pitchFamily="34" charset="0"/>
                 <a:cs typeface="Segoe UI" panose="020B0502040204020203" pitchFamily="34" charset="0"/>
               </a:rPr>
               <a:t>;</a:t>
-            </a:r>
-            <a:endParaRPr lang="ru-RU" sz="1200" dirty="0">
-              <a:latin typeface="Segoe UI" panose="020B0502040204020203" pitchFamily="34" charset="0"/>
-              <a:cs typeface="Segoe UI" panose="020B0502040204020203" pitchFamily="34" charset="0"/>
-            </a:endParaRPr>
-          </a:p>
-          <a:p>
-            <a:pPr marL="285750" indent="-285750">
-              <a:lnSpc>
-                <a:spcPct val="150000"/>
-              </a:lnSpc>
-              <a:buClr>
-                <a:srgbClr val="FFD200"/>
-              </a:buClr>
-              <a:buFont typeface="Wingdings" panose="05000000000000000000" pitchFamily="2" charset="2"/>
-              <a:buChar char="§"/>
-            </a:pPr>
-            <a:r>
-              <a:rPr lang="ru-RU" sz="1200" dirty="0">
-                <a:latin typeface="Segoe UI" panose="020B0502040204020203" pitchFamily="34" charset="0"/>
-                <a:cs typeface="Segoe UI" panose="020B0502040204020203" pitchFamily="34" charset="0"/>
-              </a:rPr>
-              <a:t>Предоставление подрядчиком по ННБ данных из памяти прибора для осуществления дополнительного контроля траектории</a:t>
-            </a:r>
-            <a:r>
-              <a:rPr lang="en-US" sz="1200" dirty="0">
-                <a:latin typeface="Segoe UI" panose="020B0502040204020203" pitchFamily="34" charset="0"/>
-                <a:cs typeface="Segoe UI" panose="020B0502040204020203" pitchFamily="34" charset="0"/>
-              </a:rPr>
-              <a:t>.</a:t>
             </a:r>
             <a:endParaRPr lang="ru-RU" sz="1200" dirty="0">
               <a:latin typeface="Segoe UI" panose="020B0502040204020203" pitchFamily="34" charset="0"/>

</xml_diff>